<commit_message>
Follow upstream master changes: restore original diagrams
Upstream se-edu/addressbook-level4@5509159 had the following changes:

1. Renamed `LogicComponentSequenceDiagram.pptx` to
   `HighLevelSequenceDiagrams.pptx`, as the contents of
   `HighLevelSequenceDiagrams.pptx` do not match `SDForDeletePerson.png`
   anymore.

2. Restored original contents of `LogicComponentSequenceDiagram.pptx`
   (corresponding source pptx file for DeletePersonSdForLogic.png) from
   se-edu/addressbook-level4@cbc6571 (last modified date of file) to
   allow updating of aforesaid diagram.

Let's follow and merge the changes from se-edu#978 into master branch to
enable us to be able to update all the diagram files accordingly.
</commit_message>
<xml_diff>
--- a/docs/diagrams/HighLevelSequenceDiagrams.pptx
+++ b/docs/diagrams/HighLevelSequenceDiagrams.pptx
@@ -110,7 +110,7 @@
   <p:extLst>
     <p:ext uri="{EFAFB233-063F-42B5-8137-9DF3F51BA10A}">
       <p15:sldGuideLst xmlns:p15="http://schemas.microsoft.com/office/powerpoint/2012/main">
-        <p15:guide id="1" orient="horz" pos="1488" userDrawn="1">
+        <p15:guide id="1" orient="horz" pos="2160" userDrawn="1">
           <p15:clr>
             <a:srgbClr val="A4A3A4"/>
           </p15:clr>
@@ -208,7 +208,7 @@
           <a:p>
             <a:fld id="{F5CC4B3F-88C1-4FFA-B1B6-F41C21DC6924}" type="datetimeFigureOut">
               <a:rPr lang="en-US" smtClean="0"/>
-              <a:t>2/26/2019</a:t>
+              <a:t>3/4/2019</a:t>
             </a:fld>
             <a:endParaRPr lang="en-US"/>
           </a:p>
@@ -475,6 +475,95 @@
 </p:notesMaster>
 </file>
 
+<file path=ppt/notesSlides/notesSlide1.xml><?xml version="1.0" encoding="utf-8"?>
+<p:notes xmlns:a="http://schemas.openxmlformats.org/drawingml/2006/main" xmlns:r="http://schemas.openxmlformats.org/officeDocument/2006/relationships" xmlns:p="http://schemas.openxmlformats.org/presentationml/2006/main">
+  <p:cSld>
+    <p:spTree>
+      <p:nvGrpSpPr>
+        <p:cNvPr id="1" name=""/>
+        <p:cNvGrpSpPr/>
+        <p:nvPr/>
+      </p:nvGrpSpPr>
+      <p:grpSpPr>
+        <a:xfrm>
+          <a:off x="0" y="0"/>
+          <a:ext cx="0" cy="0"/>
+          <a:chOff x="0" y="0"/>
+          <a:chExt cx="0" cy="0"/>
+        </a:xfrm>
+      </p:grpSpPr>
+      <p:sp>
+        <p:nvSpPr>
+          <p:cNvPr id="2" name="Slide Image Placeholder 1"/>
+          <p:cNvSpPr>
+            <a:spLocks noGrp="1" noRot="1" noChangeAspect="1"/>
+          </p:cNvSpPr>
+          <p:nvPr>
+            <p:ph type="sldImg"/>
+          </p:nvPr>
+        </p:nvSpPr>
+        <p:spPr>
+          <a:xfrm>
+            <a:off x="381000" y="685800"/>
+            <a:ext cx="6096000" cy="3429000"/>
+          </a:xfrm>
+        </p:spPr>
+      </p:sp>
+      <p:sp>
+        <p:nvSpPr>
+          <p:cNvPr id="3" name="Notes Placeholder 2"/>
+          <p:cNvSpPr>
+            <a:spLocks noGrp="1"/>
+          </p:cNvSpPr>
+          <p:nvPr>
+            <p:ph type="body" idx="1"/>
+          </p:nvPr>
+        </p:nvSpPr>
+        <p:spPr/>
+        <p:txBody>
+          <a:bodyPr/>
+          <a:lstStyle/>
+          <a:p>
+            <a:endParaRPr lang="en-SG" dirty="0"/>
+          </a:p>
+        </p:txBody>
+      </p:sp>
+      <p:sp>
+        <p:nvSpPr>
+          <p:cNvPr id="4" name="Slide Number Placeholder 3"/>
+          <p:cNvSpPr>
+            <a:spLocks noGrp="1"/>
+          </p:cNvSpPr>
+          <p:nvPr>
+            <p:ph type="sldNum" sz="quarter" idx="5"/>
+          </p:nvPr>
+        </p:nvSpPr>
+        <p:spPr/>
+        <p:txBody>
+          <a:bodyPr/>
+          <a:lstStyle/>
+          <a:p>
+            <a:fld id="{5A7AB025-77E3-4BD1-A2FD-B3183DBA47A3}" type="slidenum">
+              <a:rPr lang="en-US" smtClean="0"/>
+              <a:t>1</a:t>
+            </a:fld>
+            <a:endParaRPr lang="en-US"/>
+          </a:p>
+        </p:txBody>
+      </p:sp>
+    </p:spTree>
+    <p:extLst>
+      <p:ext uri="{BB962C8B-B14F-4D97-AF65-F5344CB8AC3E}">
+        <p14:creationId xmlns:p14="http://schemas.microsoft.com/office/powerpoint/2010/main" val="2503452583"/>
+      </p:ext>
+    </p:extLst>
+  </p:cSld>
+  <p:clrMapOvr>
+    <a:masterClrMapping/>
+  </p:clrMapOvr>
+</p:notes>
+</file>
+
 <file path=ppt/slideLayouts/slideLayout1.xml><?xml version="1.0" encoding="utf-8"?>
 <p:sldLayout xmlns:a="http://schemas.openxmlformats.org/drawingml/2006/main" xmlns:r="http://schemas.openxmlformats.org/officeDocument/2006/relationships" xmlns:p="http://schemas.openxmlformats.org/presentationml/2006/main" type="title" preserve="1">
   <p:cSld name="Title Slide">
@@ -654,7 +743,7 @@
           <a:p>
             <a:fld id="{78C97017-6FC3-485B-9764-EAC9E56C1D49}" type="datetimeFigureOut">
               <a:rPr lang="en-US" smtClean="0"/>
-              <a:t>2/26/2019</a:t>
+              <a:t>3/4/2019</a:t>
             </a:fld>
             <a:endParaRPr lang="en-US"/>
           </a:p>
@@ -822,7 +911,7 @@
           <a:p>
             <a:fld id="{78C97017-6FC3-485B-9764-EAC9E56C1D49}" type="datetimeFigureOut">
               <a:rPr lang="en-US" smtClean="0"/>
-              <a:t>2/26/2019</a:t>
+              <a:t>3/4/2019</a:t>
             </a:fld>
             <a:endParaRPr lang="en-US"/>
           </a:p>
@@ -1000,7 +1089,7 @@
           <a:p>
             <a:fld id="{78C97017-6FC3-485B-9764-EAC9E56C1D49}" type="datetimeFigureOut">
               <a:rPr lang="en-US" smtClean="0"/>
-              <a:t>2/26/2019</a:t>
+              <a:t>3/4/2019</a:t>
             </a:fld>
             <a:endParaRPr lang="en-US"/>
           </a:p>
@@ -1168,7 +1257,7 @@
           <a:p>
             <a:fld id="{78C97017-6FC3-485B-9764-EAC9E56C1D49}" type="datetimeFigureOut">
               <a:rPr lang="en-US" smtClean="0"/>
-              <a:t>2/26/2019</a:t>
+              <a:t>3/4/2019</a:t>
             </a:fld>
             <a:endParaRPr lang="en-US"/>
           </a:p>
@@ -1413,7 +1502,7 @@
           <a:p>
             <a:fld id="{78C97017-6FC3-485B-9764-EAC9E56C1D49}" type="datetimeFigureOut">
               <a:rPr lang="en-US" smtClean="0"/>
-              <a:t>2/26/2019</a:t>
+              <a:t>3/4/2019</a:t>
             </a:fld>
             <a:endParaRPr lang="en-US"/>
           </a:p>
@@ -1698,7 +1787,7 @@
           <a:p>
             <a:fld id="{78C97017-6FC3-485B-9764-EAC9E56C1D49}" type="datetimeFigureOut">
               <a:rPr lang="en-US" smtClean="0"/>
-              <a:t>2/26/2019</a:t>
+              <a:t>3/4/2019</a:t>
             </a:fld>
             <a:endParaRPr lang="en-US"/>
           </a:p>
@@ -2117,7 +2206,7 @@
           <a:p>
             <a:fld id="{78C97017-6FC3-485B-9764-EAC9E56C1D49}" type="datetimeFigureOut">
               <a:rPr lang="en-US" smtClean="0"/>
-              <a:t>2/26/2019</a:t>
+              <a:t>3/4/2019</a:t>
             </a:fld>
             <a:endParaRPr lang="en-US"/>
           </a:p>
@@ -2234,7 +2323,7 @@
           <a:p>
             <a:fld id="{78C97017-6FC3-485B-9764-EAC9E56C1D49}" type="datetimeFigureOut">
               <a:rPr lang="en-US" smtClean="0"/>
-              <a:t>2/26/2019</a:t>
+              <a:t>3/4/2019</a:t>
             </a:fld>
             <a:endParaRPr lang="en-US"/>
           </a:p>
@@ -2329,7 +2418,7 @@
           <a:p>
             <a:fld id="{78C97017-6FC3-485B-9764-EAC9E56C1D49}" type="datetimeFigureOut">
               <a:rPr lang="en-US" smtClean="0"/>
-              <a:t>2/26/2019</a:t>
+              <a:t>3/4/2019</a:t>
             </a:fld>
             <a:endParaRPr lang="en-US"/>
           </a:p>
@@ -2604,7 +2693,7 @@
           <a:p>
             <a:fld id="{78C97017-6FC3-485B-9764-EAC9E56C1D49}" type="datetimeFigureOut">
               <a:rPr lang="en-US" smtClean="0"/>
-              <a:t>2/26/2019</a:t>
+              <a:t>3/4/2019</a:t>
             </a:fld>
             <a:endParaRPr lang="en-US"/>
           </a:p>
@@ -2856,7 +2945,7 @@
           <a:p>
             <a:fld id="{78C97017-6FC3-485B-9764-EAC9E56C1D49}" type="datetimeFigureOut">
               <a:rPr lang="en-US" smtClean="0"/>
-              <a:t>2/26/2019</a:t>
+              <a:t>3/4/2019</a:t>
             </a:fld>
             <a:endParaRPr lang="en-US"/>
           </a:p>
@@ -3067,7 +3156,7 @@
           <a:p>
             <a:fld id="{78C97017-6FC3-485B-9764-EAC9E56C1D49}" type="datetimeFigureOut">
               <a:rPr lang="en-US" smtClean="0"/>
-              <a:t>2/26/2019</a:t>
+              <a:t>3/4/2019</a:t>
             </a:fld>
             <a:endParaRPr lang="en-US"/>
           </a:p>
@@ -3447,7 +3536,7 @@
           <p:cNvPr id="3" name="Group 2">
             <a:extLst>
               <a:ext uri="{FF2B5EF4-FFF2-40B4-BE49-F238E27FC236}">
-                <a16:creationId xmlns:a16="http://schemas.microsoft.com/office/drawing/2014/main" id="{A1A3C201-F750-4EC6-9140-996D316457B0}"/>
+                <a16:creationId xmlns:a16="http://schemas.microsoft.com/office/drawing/2014/main" id="{2D67108B-2C66-4D5B-B268-F806662B8838}"/>
               </a:ext>
             </a:extLst>
           </p:cNvPr>
@@ -3456,10 +3545,10 @@
         </p:nvGrpSpPr>
         <p:grpSpPr>
           <a:xfrm>
-            <a:off x="1676400" y="533401"/>
-            <a:ext cx="8915400" cy="2164943"/>
-            <a:chOff x="152400" y="533400"/>
-            <a:chExt cx="8915400" cy="2164943"/>
+            <a:off x="2434815" y="2146326"/>
+            <a:ext cx="7358323" cy="2667001"/>
+            <a:chOff x="2434815" y="2146326"/>
+            <a:chExt cx="7358323" cy="2667001"/>
           </a:xfrm>
         </p:grpSpPr>
         <p:sp>
@@ -3470,7 +3559,7 @@
           </p:nvSpPr>
           <p:spPr>
             <a:xfrm>
-              <a:off x="1111860" y="607926"/>
+              <a:off x="3429001" y="2209800"/>
               <a:ext cx="1093635" cy="346760"/>
             </a:xfrm>
             <a:prstGeom prst="rect">
@@ -3524,13 +3613,15 @@
         <p:cxnSp>
           <p:nvCxnSpPr>
             <p:cNvPr id="5" name="Straight Connector 4"/>
-            <p:cNvCxnSpPr/>
+            <p:cNvCxnSpPr>
+              <a:cxnSpLocks/>
+            </p:cNvCxnSpPr>
             <p:nvPr/>
           </p:nvCxnSpPr>
           <p:spPr>
             <a:xfrm>
-              <a:off x="1658677" y="971597"/>
-              <a:ext cx="0" cy="1723059"/>
+              <a:off x="3946261" y="2573472"/>
+              <a:ext cx="0" cy="2236189"/>
             </a:xfrm>
             <a:prstGeom prst="line">
               <a:avLst/>
@@ -3566,8 +3657,8 @@
           </p:nvSpPr>
           <p:spPr>
             <a:xfrm>
-              <a:off x="1586669" y="1322292"/>
-              <a:ext cx="152400" cy="1019910"/>
+              <a:off x="3874253" y="2924166"/>
+              <a:ext cx="152400" cy="1733094"/>
             </a:xfrm>
             <a:prstGeom prst="rect">
               <a:avLst/>
@@ -3613,7 +3704,7 @@
           </p:nvGrpSpPr>
           <p:grpSpPr>
             <a:xfrm>
-              <a:off x="152400" y="533400"/>
+              <a:off x="2434815" y="2146326"/>
               <a:ext cx="324036" cy="573410"/>
               <a:chOff x="3239901" y="4149080"/>
               <a:chExt cx="648072" cy="1146820"/>
@@ -3830,7 +3921,7 @@
           </p:nvSpPr>
           <p:spPr>
             <a:xfrm>
-              <a:off x="3335583" y="611613"/>
+              <a:off x="5084207" y="2217153"/>
               <a:ext cx="1093635" cy="346760"/>
             </a:xfrm>
             <a:prstGeom prst="rect">
@@ -3884,13 +3975,15 @@
         <p:cxnSp>
           <p:nvCxnSpPr>
             <p:cNvPr id="17" name="Straight Connector 16"/>
-            <p:cNvCxnSpPr/>
+            <p:cNvCxnSpPr>
+              <a:cxnSpLocks/>
+            </p:cNvCxnSpPr>
             <p:nvPr/>
           </p:nvCxnSpPr>
           <p:spPr>
             <a:xfrm>
-              <a:off x="3882400" y="975284"/>
-              <a:ext cx="0" cy="1723059"/>
+              <a:off x="5631023" y="2580824"/>
+              <a:ext cx="0" cy="2232502"/>
             </a:xfrm>
             <a:prstGeom prst="line">
               <a:avLst/>
@@ -3926,8 +4019,8 @@
           </p:nvSpPr>
           <p:spPr>
             <a:xfrm>
-              <a:off x="3810392" y="1433477"/>
-              <a:ext cx="144016" cy="832525"/>
+              <a:off x="5559015" y="3039018"/>
+              <a:ext cx="152376" cy="1477495"/>
             </a:xfrm>
             <a:prstGeom prst="rect">
               <a:avLst/>
@@ -3973,7 +4066,7 @@
           </p:nvSpPr>
           <p:spPr>
             <a:xfrm>
-              <a:off x="5316783" y="607926"/>
+              <a:off x="6739413" y="2213466"/>
               <a:ext cx="1093635" cy="346760"/>
             </a:xfrm>
             <a:prstGeom prst="rect">
@@ -4027,13 +4120,15 @@
         <p:cxnSp>
           <p:nvCxnSpPr>
             <p:cNvPr id="20" name="Straight Connector 19"/>
-            <p:cNvCxnSpPr/>
+            <p:cNvCxnSpPr>
+              <a:cxnSpLocks/>
+            </p:cNvCxnSpPr>
             <p:nvPr/>
           </p:nvCxnSpPr>
           <p:spPr>
             <a:xfrm>
-              <a:off x="5863600" y="971597"/>
-              <a:ext cx="0" cy="1723059"/>
+              <a:off x="7286229" y="2577138"/>
+              <a:ext cx="0" cy="2236189"/>
             </a:xfrm>
             <a:prstGeom prst="line">
               <a:avLst/>
@@ -4069,8 +4164,8 @@
           </p:nvSpPr>
           <p:spPr>
             <a:xfrm>
-              <a:off x="5791592" y="1538408"/>
-              <a:ext cx="142006" cy="651394"/>
+              <a:off x="7214221" y="3143948"/>
+              <a:ext cx="142006" cy="476510"/>
             </a:xfrm>
             <a:prstGeom prst="rect">
               <a:avLst/>
@@ -4111,13 +4206,15 @@
         <p:cxnSp>
           <p:nvCxnSpPr>
             <p:cNvPr id="23" name="Straight Arrow Connector 22"/>
-            <p:cNvCxnSpPr/>
+            <p:cNvCxnSpPr>
+              <a:cxnSpLocks/>
+            </p:cNvCxnSpPr>
             <p:nvPr/>
           </p:nvCxnSpPr>
           <p:spPr>
-            <a:xfrm>
-              <a:off x="466818" y="1325979"/>
-              <a:ext cx="1119851" cy="0"/>
+            <a:xfrm flipV="1">
+              <a:off x="2787009" y="2931520"/>
+              <a:ext cx="1095607" cy="1"/>
             </a:xfrm>
             <a:prstGeom prst="straightConnector1">
               <a:avLst/>
@@ -4152,7 +4249,7 @@
           </p:nvSpPr>
           <p:spPr>
             <a:xfrm>
-              <a:off x="466818" y="1345880"/>
+              <a:off x="2869305" y="2989204"/>
               <a:ext cx="860170" cy="215444"/>
             </a:xfrm>
             <a:prstGeom prst="rect">
@@ -4166,6 +4263,7 @@
             </a:bodyPr>
             <a:lstStyle/>
             <a:p>
+              <a:pPr algn="ctr"/>
               <a:r>
                 <a:rPr lang="en-US" sz="1400" dirty="0"/>
                 <a:t>delete 1</a:t>
@@ -4176,13 +4274,15 @@
         <p:cxnSp>
           <p:nvCxnSpPr>
             <p:cNvPr id="25" name="Straight Arrow Connector 24"/>
-            <p:cNvCxnSpPr/>
+            <p:cNvCxnSpPr>
+              <a:cxnSpLocks/>
+            </p:cNvCxnSpPr>
             <p:nvPr/>
           </p:nvCxnSpPr>
           <p:spPr>
             <a:xfrm>
-              <a:off x="1739069" y="1433478"/>
-              <a:ext cx="2071323" cy="0"/>
+              <a:off x="4042129" y="3039018"/>
+              <a:ext cx="1516886" cy="1"/>
             </a:xfrm>
             <a:prstGeom prst="straightConnector1">
               <a:avLst/>
@@ -4217,7 +4317,7 @@
           </p:nvSpPr>
           <p:spPr>
             <a:xfrm>
-              <a:off x="2166172" y="1453379"/>
+              <a:off x="4076219" y="3082866"/>
               <a:ext cx="1424846" cy="215444"/>
             </a:xfrm>
             <a:prstGeom prst="rect">
@@ -4231,6 +4331,7 @@
             </a:bodyPr>
             <a:lstStyle/>
             <a:p>
+              <a:pPr algn="ctr"/>
               <a:r>
                 <a:rPr lang="en-US" sz="1400" dirty="0">
                   <a:solidFill>
@@ -4245,13 +4346,15 @@
         <p:cxnSp>
           <p:nvCxnSpPr>
             <p:cNvPr id="28" name="Straight Arrow Connector 27"/>
-            <p:cNvCxnSpPr/>
+            <p:cNvCxnSpPr>
+              <a:cxnSpLocks/>
+            </p:cNvCxnSpPr>
             <p:nvPr/>
           </p:nvCxnSpPr>
           <p:spPr>
-            <a:xfrm>
-              <a:off x="3954408" y="1538409"/>
-              <a:ext cx="1837184" cy="0"/>
+            <a:xfrm flipV="1">
+              <a:off x="5703031" y="3143949"/>
+              <a:ext cx="1532384" cy="1"/>
             </a:xfrm>
             <a:prstGeom prst="straightConnector1">
               <a:avLst/>
@@ -4286,8 +4389,8 @@
           </p:nvSpPr>
           <p:spPr>
             <a:xfrm>
-              <a:off x="4299772" y="1542583"/>
-              <a:ext cx="1424846" cy="215444"/>
+              <a:off x="5777702" y="3150453"/>
+              <a:ext cx="1346385" cy="215444"/>
             </a:xfrm>
             <a:prstGeom prst="rect">
               <a:avLst/>
@@ -4300,6 +4403,7 @@
             </a:bodyPr>
             <a:lstStyle/>
             <a:p>
+              <a:pPr algn="ctr"/>
               <a:r>
                 <a:rPr lang="en-US" sz="1400" dirty="0" err="1">
                   <a:solidFill>
@@ -4319,71 +4423,18 @@
             </a:p>
           </p:txBody>
         </p:sp>
-        <p:sp>
-          <p:nvSpPr>
-            <p:cNvPr id="33" name="TextBox 32"/>
-            <p:cNvSpPr txBox="1"/>
-            <p:nvPr/>
-          </p:nvSpPr>
-          <p:spPr>
-            <a:xfrm>
-              <a:off x="6074030" y="1687656"/>
-              <a:ext cx="2438400" cy="215444"/>
-            </a:xfrm>
-            <a:prstGeom prst="rect">
-              <a:avLst/>
-            </a:prstGeom>
-            <a:noFill/>
-          </p:spPr>
-          <p:txBody>
-            <a:bodyPr wrap="square" lIns="0" tIns="0" rIns="0" bIns="0" rtlCol="0">
-              <a:spAutoFit/>
-            </a:bodyPr>
-            <a:lstStyle/>
-            <a:p>
-              <a:r>
-                <a:rPr lang="en-US" sz="1400" dirty="0">
-                  <a:solidFill>
-                    <a:schemeClr val="accent5">
-                      <a:lumMod val="75000"/>
-                    </a:schemeClr>
-                  </a:solidFill>
-                </a:rPr>
-                <a:t>post(</a:t>
-              </a:r>
-              <a:r>
-                <a:rPr lang="en-US" sz="1400" dirty="0" err="1">
-                  <a:solidFill>
-                    <a:schemeClr val="accent5">
-                      <a:lumMod val="75000"/>
-                    </a:schemeClr>
-                  </a:solidFill>
-                </a:rPr>
-                <a:t>AddressBookChangedEvent</a:t>
-              </a:r>
-              <a:r>
-                <a:rPr lang="en-US" sz="1400" dirty="0">
-                  <a:solidFill>
-                    <a:schemeClr val="accent5">
-                      <a:lumMod val="75000"/>
-                    </a:schemeClr>
-                  </a:solidFill>
-                </a:rPr>
-                <a:t>)</a:t>
-              </a:r>
-            </a:p>
-          </p:txBody>
-        </p:sp>
         <p:cxnSp>
           <p:nvCxnSpPr>
             <p:cNvPr id="34" name="Straight Arrow Connector 33"/>
-            <p:cNvCxnSpPr/>
+            <p:cNvCxnSpPr>
+              <a:cxnSpLocks/>
+            </p:cNvCxnSpPr>
             <p:nvPr/>
           </p:nvCxnSpPr>
           <p:spPr>
             <a:xfrm>
-              <a:off x="3954408" y="2190681"/>
-              <a:ext cx="1837184" cy="0"/>
+              <a:off x="5681837" y="3594126"/>
+              <a:ext cx="1532384" cy="0"/>
             </a:xfrm>
             <a:prstGeom prst="straightConnector1">
               <a:avLst/>
@@ -4415,13 +4466,15 @@
         <p:cxnSp>
           <p:nvCxnSpPr>
             <p:cNvPr id="35" name="Straight Arrow Connector 34"/>
-            <p:cNvCxnSpPr/>
+            <p:cNvCxnSpPr>
+              <a:cxnSpLocks/>
+            </p:cNvCxnSpPr>
             <p:nvPr/>
           </p:nvCxnSpPr>
           <p:spPr>
             <a:xfrm>
-              <a:off x="1739069" y="2266002"/>
-              <a:ext cx="2058118" cy="0"/>
+              <a:off x="4026653" y="4507812"/>
+              <a:ext cx="1532362" cy="0"/>
             </a:xfrm>
             <a:prstGeom prst="straightConnector1">
               <a:avLst/>
@@ -4453,13 +4506,15 @@
         <p:cxnSp>
           <p:nvCxnSpPr>
             <p:cNvPr id="37" name="Straight Arrow Connector 36"/>
-            <p:cNvCxnSpPr/>
+            <p:cNvCxnSpPr>
+              <a:cxnSpLocks/>
+            </p:cNvCxnSpPr>
             <p:nvPr/>
           </p:nvCxnSpPr>
           <p:spPr>
             <a:xfrm>
-              <a:off x="390618" y="2342202"/>
-              <a:ext cx="1196051" cy="0"/>
+              <a:off x="2787009" y="4657260"/>
+              <a:ext cx="1087245" cy="0"/>
             </a:xfrm>
             <a:prstGeom prst="straightConnector1">
               <a:avLst/>
@@ -4490,308 +4545,13 @@
         </p:cxnSp>
         <p:sp>
           <p:nvSpPr>
-            <p:cNvPr id="39" name="Rectangle 62"/>
-            <p:cNvSpPr/>
-            <p:nvPr/>
-          </p:nvSpPr>
-          <p:spPr>
-            <a:xfrm>
-              <a:off x="7696200" y="591251"/>
-              <a:ext cx="1371600" cy="346760"/>
-            </a:xfrm>
-            <a:prstGeom prst="rect">
-              <a:avLst/>
-            </a:prstGeom>
-            <a:solidFill>
-              <a:schemeClr val="accent5">
-                <a:lumMod val="75000"/>
-              </a:schemeClr>
-            </a:solidFill>
-            <a:ln w="19050">
-              <a:solidFill>
-                <a:schemeClr val="accent5">
-                  <a:lumMod val="75000"/>
-                </a:schemeClr>
-              </a:solidFill>
-            </a:ln>
-            <a:effectLst/>
-          </p:spPr>
-          <p:style>
-            <a:lnRef idx="1">
-              <a:schemeClr val="accent2"/>
-            </a:lnRef>
-            <a:fillRef idx="2">
-              <a:schemeClr val="accent2"/>
-            </a:fillRef>
-            <a:effectRef idx="1">
-              <a:schemeClr val="accent2"/>
-            </a:effectRef>
-            <a:fontRef idx="minor">
-              <a:schemeClr val="dk1"/>
-            </a:fontRef>
-          </p:style>
-          <p:txBody>
-            <a:bodyPr rtlCol="0" anchor="ctr"/>
-            <a:lstStyle/>
-            <a:p>
-              <a:pPr algn="ctr"/>
-              <a:r>
-                <a:rPr lang="en-US" sz="1600" dirty="0">
-                  <a:solidFill>
-                    <a:schemeClr val="bg1"/>
-                  </a:solidFill>
-                </a:rPr>
-                <a:t>:</a:t>
-              </a:r>
-              <a:r>
-                <a:rPr lang="en-US" sz="1600" dirty="0" err="1">
-                  <a:solidFill>
-                    <a:schemeClr val="bg1"/>
-                  </a:solidFill>
-                </a:rPr>
-                <a:t>EventsCenter</a:t>
-              </a:r>
-              <a:endParaRPr lang="en-SG" sz="1600" dirty="0">
-                <a:solidFill>
-                  <a:schemeClr val="bg1"/>
-                </a:solidFill>
-              </a:endParaRPr>
-            </a:p>
-          </p:txBody>
-        </p:sp>
-        <p:cxnSp>
-          <p:nvCxnSpPr>
-            <p:cNvPr id="40" name="Straight Connector 39"/>
-            <p:cNvCxnSpPr/>
-            <p:nvPr/>
-          </p:nvCxnSpPr>
-          <p:spPr>
-            <a:xfrm>
-              <a:off x="8616802" y="944305"/>
-              <a:ext cx="0" cy="1723059"/>
-            </a:xfrm>
-            <a:prstGeom prst="line">
-              <a:avLst/>
-            </a:prstGeom>
-            <a:ln w="19050">
-              <a:solidFill>
-                <a:schemeClr val="accent5">
-                  <a:lumMod val="75000"/>
-                </a:schemeClr>
-              </a:solidFill>
-              <a:prstDash val="sysDash"/>
-            </a:ln>
-            <a:effectLst/>
-          </p:spPr>
-          <p:style>
-            <a:lnRef idx="1">
-              <a:schemeClr val="accent1"/>
-            </a:lnRef>
-            <a:fillRef idx="2">
-              <a:schemeClr val="accent1"/>
-            </a:fillRef>
-            <a:effectRef idx="1">
-              <a:schemeClr val="accent1"/>
-            </a:effectRef>
-            <a:fontRef idx="minor">
-              <a:schemeClr val="dk1"/>
-            </a:fontRef>
-          </p:style>
-        </p:cxnSp>
-        <p:sp>
-          <p:nvSpPr>
-            <p:cNvPr id="41" name="Rectangle 40"/>
-            <p:cNvSpPr/>
-            <p:nvPr/>
-          </p:nvSpPr>
-          <p:spPr>
-            <a:xfrm>
-              <a:off x="8544794" y="1961202"/>
-              <a:ext cx="142006" cy="176787"/>
-            </a:xfrm>
-            <a:prstGeom prst="rect">
-              <a:avLst/>
-            </a:prstGeom>
-            <a:solidFill>
-              <a:schemeClr val="accent5">
-                <a:lumMod val="75000"/>
-              </a:schemeClr>
-            </a:solidFill>
-            <a:ln>
-              <a:solidFill>
-                <a:schemeClr val="accent5">
-                  <a:lumMod val="75000"/>
-                </a:schemeClr>
-              </a:solidFill>
-            </a:ln>
-            <a:effectLst/>
-          </p:spPr>
-          <p:style>
-            <a:lnRef idx="1">
-              <a:schemeClr val="accent3"/>
-            </a:lnRef>
-            <a:fillRef idx="2">
-              <a:schemeClr val="accent3"/>
-            </a:fillRef>
-            <a:effectRef idx="1">
-              <a:schemeClr val="accent3"/>
-            </a:effectRef>
-            <a:fontRef idx="minor">
-              <a:schemeClr val="dk1"/>
-            </a:fontRef>
-          </p:style>
-          <p:txBody>
-            <a:bodyPr rtlCol="0" anchor="ctr"/>
-            <a:lstStyle/>
-            <a:p>
-              <a:pPr algn="ctr"/>
-              <a:endParaRPr lang="en-SG" sz="1400"/>
-            </a:p>
-          </p:txBody>
-        </p:sp>
-        <p:cxnSp>
-          <p:nvCxnSpPr>
-            <p:cNvPr id="42" name="Straight Arrow Connector 41"/>
-            <p:cNvCxnSpPr/>
-            <p:nvPr/>
-          </p:nvCxnSpPr>
-          <p:spPr>
-            <a:xfrm>
-              <a:off x="5943992" y="1961202"/>
-              <a:ext cx="2568438" cy="0"/>
-            </a:xfrm>
-            <a:prstGeom prst="straightConnector1">
-              <a:avLst/>
-            </a:prstGeom>
-            <a:ln w="19050">
-              <a:solidFill>
-                <a:srgbClr val="7030A0"/>
-              </a:solidFill>
-              <a:tailEnd type="arrow"/>
-            </a:ln>
-          </p:spPr>
-          <p:style>
-            <a:lnRef idx="1">
-              <a:schemeClr val="accent1"/>
-            </a:lnRef>
-            <a:fillRef idx="0">
-              <a:schemeClr val="accent1"/>
-            </a:fillRef>
-            <a:effectRef idx="0">
-              <a:schemeClr val="accent1"/>
-            </a:effectRef>
-            <a:fontRef idx="minor">
-              <a:schemeClr val="tx1"/>
-            </a:fontRef>
-          </p:style>
-        </p:cxnSp>
-        <p:cxnSp>
-          <p:nvCxnSpPr>
-            <p:cNvPr id="44" name="Straight Arrow Connector 43"/>
-            <p:cNvCxnSpPr/>
-            <p:nvPr/>
-          </p:nvCxnSpPr>
-          <p:spPr>
-            <a:xfrm>
-              <a:off x="5943992" y="2137989"/>
-              <a:ext cx="2549946" cy="0"/>
-            </a:xfrm>
-            <a:prstGeom prst="straightConnector1">
-              <a:avLst/>
-            </a:prstGeom>
-            <a:ln w="19050">
-              <a:solidFill>
-                <a:schemeClr val="accent5">
-                  <a:lumMod val="75000"/>
-                </a:schemeClr>
-              </a:solidFill>
-              <a:prstDash val="sysDash"/>
-              <a:headEnd type="arrow" w="med" len="med"/>
-              <a:tailEnd type="none" w="med" len="med"/>
-            </a:ln>
-          </p:spPr>
-          <p:style>
-            <a:lnRef idx="1">
-              <a:schemeClr val="accent1"/>
-            </a:lnRef>
-            <a:fillRef idx="0">
-              <a:schemeClr val="accent1"/>
-            </a:fillRef>
-            <a:effectRef idx="0">
-              <a:schemeClr val="accent1"/>
-            </a:effectRef>
-            <a:fontRef idx="minor">
-              <a:schemeClr val="tx1"/>
-            </a:fontRef>
-          </p:style>
-        </p:cxnSp>
-        <p:cxnSp>
-          <p:nvCxnSpPr>
-            <p:cNvPr id="85" name="Straight Connector 84"/>
-            <p:cNvCxnSpPr/>
-            <p:nvPr/>
-          </p:nvCxnSpPr>
-          <p:spPr>
-            <a:xfrm flipH="1">
-              <a:off x="314394" y="1099672"/>
-              <a:ext cx="24" cy="1598671"/>
-            </a:xfrm>
-            <a:prstGeom prst="line">
-              <a:avLst/>
-            </a:prstGeom>
-            <a:ln w="19050">
-              <a:solidFill>
-                <a:schemeClr val="tx1"/>
-              </a:solidFill>
-              <a:prstDash val="sysDash"/>
-            </a:ln>
-            <a:effectLst/>
-          </p:spPr>
-          <p:style>
-            <a:lnRef idx="1">
-              <a:schemeClr val="accent1"/>
-            </a:lnRef>
-            <a:fillRef idx="2">
-              <a:schemeClr val="accent1"/>
-            </a:fillRef>
-            <a:effectRef idx="1">
-              <a:schemeClr val="accent1"/>
-            </a:effectRef>
-            <a:fontRef idx="minor">
-              <a:schemeClr val="dk1"/>
-            </a:fontRef>
-          </p:style>
-        </p:cxnSp>
-      </p:grpSp>
-      <p:grpSp>
-        <p:nvGrpSpPr>
-          <p:cNvPr id="4" name="Group 3">
-            <a:extLst>
-              <a:ext uri="{FF2B5EF4-FFF2-40B4-BE49-F238E27FC236}">
-                <a16:creationId xmlns:a16="http://schemas.microsoft.com/office/drawing/2014/main" id="{F7A1326A-6BA9-43B1-8D30-F2DB3DF47557}"/>
-              </a:ext>
-            </a:extLst>
-          </p:cNvPr>
-          <p:cNvGrpSpPr/>
-          <p:nvPr/>
-        </p:nvGrpSpPr>
-        <p:grpSpPr>
-          <a:xfrm>
-            <a:off x="1718562" y="4278322"/>
-            <a:ext cx="8568438" cy="2093024"/>
-            <a:chOff x="194562" y="4278322"/>
-            <a:chExt cx="8568438" cy="2093024"/>
-          </a:xfrm>
-        </p:grpSpPr>
-        <p:sp>
-          <p:nvSpPr>
             <p:cNvPr id="53" name="Rectangle 62"/>
             <p:cNvSpPr/>
             <p:nvPr/>
           </p:nvSpPr>
           <p:spPr>
             <a:xfrm>
-              <a:off x="7370178" y="4278322"/>
+              <a:off x="8394619" y="2213466"/>
               <a:ext cx="1093635" cy="346760"/>
             </a:xfrm>
             <a:prstGeom prst="rect">
@@ -4849,13 +4609,15 @@
         <p:cxnSp>
           <p:nvCxnSpPr>
             <p:cNvPr id="54" name="Straight Connector 53"/>
-            <p:cNvCxnSpPr/>
+            <p:cNvCxnSpPr>
+              <a:cxnSpLocks/>
+            </p:cNvCxnSpPr>
             <p:nvPr/>
           </p:nvCxnSpPr>
           <p:spPr>
             <a:xfrm>
-              <a:off x="7916995" y="4641993"/>
-              <a:ext cx="0" cy="1723059"/>
+              <a:off x="8941435" y="2538762"/>
+              <a:ext cx="0" cy="2274565"/>
             </a:xfrm>
             <a:prstGeom prst="line">
               <a:avLst/>
@@ -4893,8 +4655,8 @@
           </p:nvSpPr>
           <p:spPr>
             <a:xfrm>
-              <a:off x="7844987" y="5335662"/>
-              <a:ext cx="124478" cy="287409"/>
+              <a:off x="8875124" y="3879151"/>
+              <a:ext cx="124478" cy="457919"/>
             </a:xfrm>
             <a:prstGeom prst="rect">
               <a:avLst/>
@@ -4936,71 +4698,19 @@
             </a:p>
           </p:txBody>
         </p:sp>
-        <p:sp>
-          <p:nvSpPr>
-            <p:cNvPr id="62" name="TextBox 61"/>
-            <p:cNvSpPr txBox="1"/>
-            <p:nvPr/>
-          </p:nvSpPr>
-          <p:spPr>
-            <a:xfrm>
-              <a:off x="1810094" y="4797674"/>
-              <a:ext cx="2716635" cy="215444"/>
-            </a:xfrm>
-            <a:prstGeom prst="rect">
-              <a:avLst/>
-            </a:prstGeom>
-            <a:noFill/>
-          </p:spPr>
-          <p:txBody>
-            <a:bodyPr wrap="square" lIns="0" tIns="0" rIns="0" bIns="0" rtlCol="0">
-              <a:spAutoFit/>
-            </a:bodyPr>
-            <a:lstStyle/>
-            <a:p>
-              <a:r>
-                <a:rPr lang="en-US" sz="1400" dirty="0">
-                  <a:solidFill>
-                    <a:schemeClr val="accent5">
-                      <a:lumMod val="75000"/>
-                    </a:schemeClr>
-                  </a:solidFill>
-                </a:rPr>
-                <a:t>post(</a:t>
-              </a:r>
-              <a:r>
-                <a:rPr lang="en-US" sz="1400" dirty="0" err="1">
-                  <a:solidFill>
-                    <a:schemeClr val="accent5">
-                      <a:lumMod val="75000"/>
-                    </a:schemeClr>
-                  </a:solidFill>
-                </a:rPr>
-                <a:t>AddressBookChangedEvent</a:t>
-              </a:r>
-              <a:r>
-                <a:rPr lang="en-US" sz="1400" dirty="0">
-                  <a:solidFill>
-                    <a:schemeClr val="accent5">
-                      <a:lumMod val="75000"/>
-                    </a:schemeClr>
-                  </a:solidFill>
-                </a:rPr>
-                <a:t>)</a:t>
-              </a:r>
-            </a:p>
-          </p:txBody>
-        </p:sp>
         <p:cxnSp>
           <p:nvCxnSpPr>
             <p:cNvPr id="63" name="Straight Arrow Connector 62"/>
-            <p:cNvCxnSpPr/>
+            <p:cNvCxnSpPr>
+              <a:cxnSpLocks/>
+              <a:stCxn id="55" idx="2"/>
+            </p:cNvCxnSpPr>
             <p:nvPr/>
           </p:nvCxnSpPr>
           <p:spPr>
-            <a:xfrm flipH="1">
-              <a:off x="4526729" y="5623071"/>
-              <a:ext cx="3383941" cy="0"/>
+            <a:xfrm flipH="1" flipV="1">
+              <a:off x="5711393" y="4336999"/>
+              <a:ext cx="3225970" cy="70"/>
             </a:xfrm>
             <a:prstGeom prst="straightConnector1">
               <a:avLst/>
@@ -5033,94 +4743,89 @@
         </p:cxnSp>
         <p:sp>
           <p:nvSpPr>
-            <p:cNvPr id="66" name="Rectangle 62"/>
-            <p:cNvSpPr/>
+            <p:cNvPr id="74" name="TextBox 73"/>
+            <p:cNvSpPr txBox="1"/>
             <p:nvPr/>
           </p:nvSpPr>
           <p:spPr>
             <a:xfrm>
-              <a:off x="3791146" y="4295233"/>
-              <a:ext cx="1371600" cy="346760"/>
+              <a:off x="6008157" y="3921005"/>
+              <a:ext cx="2466828" cy="215444"/>
             </a:xfrm>
             <a:prstGeom prst="rect">
               <a:avLst/>
             </a:prstGeom>
-            <a:solidFill>
-              <a:schemeClr val="accent5">
-                <a:lumMod val="75000"/>
-              </a:schemeClr>
-            </a:solidFill>
-            <a:ln w="19050">
-              <a:solidFill>
-                <a:schemeClr val="accent5">
-                  <a:lumMod val="75000"/>
-                </a:schemeClr>
-              </a:solidFill>
-            </a:ln>
-            <a:effectLst/>
+            <a:noFill/>
           </p:spPr>
-          <p:style>
-            <a:lnRef idx="1">
-              <a:schemeClr val="accent2"/>
-            </a:lnRef>
-            <a:fillRef idx="2">
-              <a:schemeClr val="accent2"/>
-            </a:fillRef>
-            <a:effectRef idx="1">
-              <a:schemeClr val="accent2"/>
-            </a:effectRef>
-            <a:fontRef idx="minor">
-              <a:schemeClr val="dk1"/>
-            </a:fontRef>
-          </p:style>
           <p:txBody>
-            <a:bodyPr rtlCol="0" anchor="ctr"/>
+            <a:bodyPr wrap="square" lIns="0" tIns="0" rIns="0" bIns="0" rtlCol="0">
+              <a:spAutoFit/>
+            </a:bodyPr>
             <a:lstStyle/>
             <a:p>
               <a:pPr algn="ctr"/>
               <a:r>
-                <a:rPr lang="en-US" sz="1600" dirty="0">
+                <a:rPr lang="en-US" sz="1400" dirty="0" err="1">
                   <a:solidFill>
-                    <a:schemeClr val="bg1"/>
+                    <a:schemeClr val="accent6">
+                      <a:lumMod val="75000"/>
+                    </a:schemeClr>
                   </a:solidFill>
                 </a:rPr>
-                <a:t>:</a:t>
+                <a:t>saveAddressBook</a:t>
               </a:r>
               <a:r>
-                <a:rPr lang="en-US" sz="1600" dirty="0" err="1">
+                <a:rPr lang="en-US" sz="1400" dirty="0">
                   <a:solidFill>
-                    <a:schemeClr val="bg1"/>
+                    <a:schemeClr val="accent6">
+                      <a:lumMod val="75000"/>
+                    </a:schemeClr>
                   </a:solidFill>
                 </a:rPr>
-                <a:t>EventsCenter</a:t>
+                <a:t>(</a:t>
               </a:r>
-              <a:endParaRPr lang="en-SG" sz="1600" dirty="0">
-                <a:solidFill>
-                  <a:schemeClr val="bg1"/>
-                </a:solidFill>
-              </a:endParaRPr>
+              <a:r>
+                <a:rPr lang="en-US" sz="1400" dirty="0" err="1">
+                  <a:solidFill>
+                    <a:schemeClr val="accent6">
+                      <a:lumMod val="75000"/>
+                    </a:schemeClr>
+                  </a:solidFill>
+                </a:rPr>
+                <a:t>AddressBook</a:t>
+              </a:r>
+              <a:r>
+                <a:rPr lang="en-US" sz="1400" dirty="0">
+                  <a:solidFill>
+                    <a:schemeClr val="accent6">
+                      <a:lumMod val="75000"/>
+                    </a:schemeClr>
+                  </a:solidFill>
+                </a:rPr>
+                <a:t>)</a:t>
+              </a:r>
             </a:p>
           </p:txBody>
         </p:sp>
         <p:cxnSp>
           <p:nvCxnSpPr>
-            <p:cNvPr id="67" name="Straight Connector 66"/>
-            <p:cNvCxnSpPr/>
+            <p:cNvPr id="85" name="Straight Connector 84"/>
+            <p:cNvCxnSpPr>
+              <a:cxnSpLocks/>
+            </p:cNvCxnSpPr>
             <p:nvPr/>
           </p:nvCxnSpPr>
           <p:spPr>
             <a:xfrm>
-              <a:off x="4456731" y="4648287"/>
-              <a:ext cx="0" cy="1723059"/>
+              <a:off x="2596833" y="2712598"/>
+              <a:ext cx="0" cy="2100728"/>
             </a:xfrm>
             <a:prstGeom prst="line">
               <a:avLst/>
             </a:prstGeom>
             <a:ln w="19050">
               <a:solidFill>
-                <a:schemeClr val="accent5">
-                  <a:lumMod val="75000"/>
-                </a:schemeClr>
+                <a:schemeClr val="tx1"/>
               </a:solidFill>
               <a:prstDash val="sysDash"/>
             </a:ln>
@@ -5141,667 +4846,6 @@
             </a:fontRef>
           </p:style>
         </p:cxnSp>
-        <p:sp>
-          <p:nvSpPr>
-            <p:cNvPr id="68" name="Rectangle 67"/>
-            <p:cNvSpPr/>
-            <p:nvPr/>
-          </p:nvSpPr>
-          <p:spPr>
-            <a:xfrm>
-              <a:off x="4384723" y="5071220"/>
-              <a:ext cx="142006" cy="1036757"/>
-            </a:xfrm>
-            <a:prstGeom prst="rect">
-              <a:avLst/>
-            </a:prstGeom>
-            <a:solidFill>
-              <a:schemeClr val="accent5">
-                <a:lumMod val="75000"/>
-              </a:schemeClr>
-            </a:solidFill>
-            <a:ln>
-              <a:solidFill>
-                <a:schemeClr val="accent5">
-                  <a:lumMod val="75000"/>
-                </a:schemeClr>
-              </a:solidFill>
-            </a:ln>
-            <a:effectLst/>
-          </p:spPr>
-          <p:style>
-            <a:lnRef idx="1">
-              <a:schemeClr val="accent3"/>
-            </a:lnRef>
-            <a:fillRef idx="2">
-              <a:schemeClr val="accent3"/>
-            </a:fillRef>
-            <a:effectRef idx="1">
-              <a:schemeClr val="accent3"/>
-            </a:effectRef>
-            <a:fontRef idx="minor">
-              <a:schemeClr val="dk1"/>
-            </a:fontRef>
-          </p:style>
-          <p:txBody>
-            <a:bodyPr rtlCol="0" anchor="ctr"/>
-            <a:lstStyle/>
-            <a:p>
-              <a:pPr algn="ctr"/>
-              <a:endParaRPr lang="en-SG" sz="1400"/>
-            </a:p>
-          </p:txBody>
-        </p:sp>
-        <p:cxnSp>
-          <p:nvCxnSpPr>
-            <p:cNvPr id="69" name="Straight Arrow Connector 68"/>
-            <p:cNvCxnSpPr/>
-            <p:nvPr/>
-          </p:nvCxnSpPr>
-          <p:spPr>
-            <a:xfrm>
-              <a:off x="3078929" y="5071220"/>
-              <a:ext cx="1295400" cy="0"/>
-            </a:xfrm>
-            <a:prstGeom prst="straightConnector1">
-              <a:avLst/>
-            </a:prstGeom>
-            <a:ln w="19050">
-              <a:solidFill>
-                <a:srgbClr val="7030A0"/>
-              </a:solidFill>
-              <a:tailEnd type="arrow"/>
-            </a:ln>
-          </p:spPr>
-          <p:style>
-            <a:lnRef idx="1">
-              <a:schemeClr val="accent1"/>
-            </a:lnRef>
-            <a:fillRef idx="0">
-              <a:schemeClr val="accent1"/>
-            </a:fillRef>
-            <a:effectRef idx="0">
-              <a:schemeClr val="accent1"/>
-            </a:effectRef>
-            <a:fontRef idx="minor">
-              <a:schemeClr val="tx1"/>
-            </a:fontRef>
-          </p:style>
-        </p:cxnSp>
-        <p:cxnSp>
-          <p:nvCxnSpPr>
-            <p:cNvPr id="70" name="Straight Arrow Connector 69"/>
-            <p:cNvCxnSpPr/>
-            <p:nvPr/>
-          </p:nvCxnSpPr>
-          <p:spPr>
-            <a:xfrm>
-              <a:off x="2975642" y="6107977"/>
-              <a:ext cx="1448755" cy="0"/>
-            </a:xfrm>
-            <a:prstGeom prst="straightConnector1">
-              <a:avLst/>
-            </a:prstGeom>
-            <a:ln w="19050">
-              <a:solidFill>
-                <a:schemeClr val="accent5">
-                  <a:lumMod val="75000"/>
-                </a:schemeClr>
-              </a:solidFill>
-              <a:prstDash val="sysDash"/>
-              <a:headEnd type="arrow" w="med" len="med"/>
-              <a:tailEnd type="none" w="med" len="med"/>
-            </a:ln>
-          </p:spPr>
-          <p:style>
-            <a:lnRef idx="1">
-              <a:schemeClr val="accent1"/>
-            </a:lnRef>
-            <a:fillRef idx="0">
-              <a:schemeClr val="accent1"/>
-            </a:fillRef>
-            <a:effectRef idx="0">
-              <a:schemeClr val="accent1"/>
-            </a:effectRef>
-            <a:fontRef idx="minor">
-              <a:schemeClr val="tx1"/>
-            </a:fontRef>
-          </p:style>
-        </p:cxnSp>
-        <p:cxnSp>
-          <p:nvCxnSpPr>
-            <p:cNvPr id="72" name="Straight Arrow Connector 71"/>
-            <p:cNvCxnSpPr/>
-            <p:nvPr/>
-          </p:nvCxnSpPr>
-          <p:spPr>
-            <a:xfrm>
-              <a:off x="4526729" y="5341014"/>
-              <a:ext cx="3318258" cy="0"/>
-            </a:xfrm>
-            <a:prstGeom prst="straightConnector1">
-              <a:avLst/>
-            </a:prstGeom>
-            <a:ln w="19050">
-              <a:solidFill>
-                <a:schemeClr val="accent5">
-                  <a:lumMod val="75000"/>
-                </a:schemeClr>
-              </a:solidFill>
-              <a:headEnd type="none" w="med" len="med"/>
-              <a:tailEnd type="arrow" w="med" len="med"/>
-            </a:ln>
-          </p:spPr>
-          <p:style>
-            <a:lnRef idx="1">
-              <a:schemeClr val="accent1"/>
-            </a:lnRef>
-            <a:fillRef idx="0">
-              <a:schemeClr val="accent1"/>
-            </a:fillRef>
-            <a:effectRef idx="0">
-              <a:schemeClr val="accent1"/>
-            </a:effectRef>
-            <a:fontRef idx="minor">
-              <a:schemeClr val="tx1"/>
-            </a:fontRef>
-          </p:style>
-        </p:cxnSp>
-        <p:sp>
-          <p:nvSpPr>
-            <p:cNvPr id="74" name="TextBox 73"/>
-            <p:cNvSpPr txBox="1"/>
-            <p:nvPr/>
-          </p:nvSpPr>
-          <p:spPr>
-            <a:xfrm>
-              <a:off x="5036330" y="5065911"/>
-              <a:ext cx="2659870" cy="215444"/>
-            </a:xfrm>
-            <a:prstGeom prst="rect">
-              <a:avLst/>
-            </a:prstGeom>
-            <a:noFill/>
-          </p:spPr>
-          <p:txBody>
-            <a:bodyPr wrap="square" lIns="0" tIns="0" rIns="0" bIns="0" rtlCol="0">
-              <a:spAutoFit/>
-            </a:bodyPr>
-            <a:lstStyle/>
-            <a:p>
-              <a:r>
-                <a:rPr lang="en-US" sz="1400" dirty="0" err="1">
-                  <a:solidFill>
-                    <a:schemeClr val="accent6">
-                      <a:lumMod val="75000"/>
-                    </a:schemeClr>
-                  </a:solidFill>
-                </a:rPr>
-                <a:t>handleAddresssBookChangedEvent</a:t>
-              </a:r>
-              <a:r>
-                <a:rPr lang="en-US" sz="1400" dirty="0">
-                  <a:solidFill>
-                    <a:schemeClr val="accent6">
-                      <a:lumMod val="75000"/>
-                    </a:schemeClr>
-                  </a:solidFill>
-                </a:rPr>
-                <a:t>()</a:t>
-              </a:r>
-            </a:p>
-          </p:txBody>
-        </p:sp>
-        <p:sp>
-          <p:nvSpPr>
-            <p:cNvPr id="45" name="Rectangle 62"/>
-            <p:cNvSpPr/>
-            <p:nvPr/>
-          </p:nvSpPr>
-          <p:spPr>
-            <a:xfrm>
-              <a:off x="721634" y="4278322"/>
-              <a:ext cx="1093635" cy="346760"/>
-            </a:xfrm>
-            <a:prstGeom prst="rect">
-              <a:avLst/>
-            </a:prstGeom>
-            <a:solidFill>
-              <a:srgbClr val="00B050"/>
-            </a:solidFill>
-            <a:ln w="19050">
-              <a:solidFill>
-                <a:srgbClr val="00B050"/>
-              </a:solidFill>
-            </a:ln>
-            <a:effectLst/>
-          </p:spPr>
-          <p:style>
-            <a:lnRef idx="1">
-              <a:schemeClr val="accent2"/>
-            </a:lnRef>
-            <a:fillRef idx="2">
-              <a:schemeClr val="accent2"/>
-            </a:fillRef>
-            <a:effectRef idx="1">
-              <a:schemeClr val="accent2"/>
-            </a:effectRef>
-            <a:fontRef idx="minor">
-              <a:schemeClr val="dk1"/>
-            </a:fontRef>
-          </p:style>
-          <p:txBody>
-            <a:bodyPr rtlCol="0" anchor="ctr"/>
-            <a:lstStyle/>
-            <a:p>
-              <a:pPr algn="ctr"/>
-              <a:r>
-                <a:rPr lang="en-US" sz="1600" dirty="0">
-                  <a:solidFill>
-                    <a:schemeClr val="bg1"/>
-                  </a:solidFill>
-                </a:rPr>
-                <a:t>:UI</a:t>
-              </a:r>
-              <a:endParaRPr lang="en-SG" sz="1600" dirty="0">
-                <a:solidFill>
-                  <a:schemeClr val="bg1"/>
-                </a:solidFill>
-              </a:endParaRPr>
-            </a:p>
-          </p:txBody>
-        </p:sp>
-        <p:cxnSp>
-          <p:nvCxnSpPr>
-            <p:cNvPr id="46" name="Straight Connector 45"/>
-            <p:cNvCxnSpPr/>
-            <p:nvPr/>
-          </p:nvCxnSpPr>
-          <p:spPr>
-            <a:xfrm>
-              <a:off x="1268451" y="4641993"/>
-              <a:ext cx="0" cy="1723059"/>
-            </a:xfrm>
-            <a:prstGeom prst="line">
-              <a:avLst/>
-            </a:prstGeom>
-            <a:ln w="19050">
-              <a:solidFill>
-                <a:srgbClr val="00B050"/>
-              </a:solidFill>
-              <a:prstDash val="sysDash"/>
-            </a:ln>
-            <a:effectLst/>
-          </p:spPr>
-          <p:style>
-            <a:lnRef idx="1">
-              <a:schemeClr val="accent1"/>
-            </a:lnRef>
-            <a:fillRef idx="2">
-              <a:schemeClr val="accent1"/>
-            </a:fillRef>
-            <a:effectRef idx="1">
-              <a:schemeClr val="accent1"/>
-            </a:effectRef>
-            <a:fontRef idx="minor">
-              <a:schemeClr val="dk1"/>
-            </a:fontRef>
-          </p:style>
-        </p:cxnSp>
-        <p:sp>
-          <p:nvSpPr>
-            <p:cNvPr id="47" name="Rectangle 46"/>
-            <p:cNvSpPr/>
-            <p:nvPr/>
-          </p:nvSpPr>
-          <p:spPr>
-            <a:xfrm>
-              <a:off x="1196443" y="5670472"/>
-              <a:ext cx="130545" cy="273128"/>
-            </a:xfrm>
-            <a:prstGeom prst="rect">
-              <a:avLst/>
-            </a:prstGeom>
-            <a:solidFill>
-              <a:srgbClr val="00B050"/>
-            </a:solidFill>
-            <a:ln>
-              <a:solidFill>
-                <a:srgbClr val="00B050"/>
-              </a:solidFill>
-            </a:ln>
-            <a:effectLst/>
-          </p:spPr>
-          <p:style>
-            <a:lnRef idx="1">
-              <a:schemeClr val="accent3"/>
-            </a:lnRef>
-            <a:fillRef idx="2">
-              <a:schemeClr val="accent3"/>
-            </a:fillRef>
-            <a:effectRef idx="1">
-              <a:schemeClr val="accent3"/>
-            </a:effectRef>
-            <a:fontRef idx="minor">
-              <a:schemeClr val="dk1"/>
-            </a:fontRef>
-          </p:style>
-          <p:txBody>
-            <a:bodyPr rtlCol="0" anchor="ctr"/>
-            <a:lstStyle/>
-            <a:p>
-              <a:pPr algn="ctr"/>
-              <a:endParaRPr lang="en-SG" sz="1400"/>
-            </a:p>
-          </p:txBody>
-        </p:sp>
-        <p:cxnSp>
-          <p:nvCxnSpPr>
-            <p:cNvPr id="48" name="Straight Arrow Connector 47"/>
-            <p:cNvCxnSpPr/>
-            <p:nvPr/>
-          </p:nvCxnSpPr>
-          <p:spPr>
-            <a:xfrm flipH="1">
-              <a:off x="1348843" y="5943600"/>
-              <a:ext cx="3061842" cy="0"/>
-            </a:xfrm>
-            <a:prstGeom prst="straightConnector1">
-              <a:avLst/>
-            </a:prstGeom>
-            <a:ln w="19050">
-              <a:solidFill>
-                <a:srgbClr val="00B050"/>
-              </a:solidFill>
-              <a:prstDash val="sysDash"/>
-              <a:headEnd type="arrow" w="med" len="med"/>
-              <a:tailEnd type="none" w="med" len="med"/>
-            </a:ln>
-          </p:spPr>
-          <p:style>
-            <a:lnRef idx="1">
-              <a:schemeClr val="accent1"/>
-            </a:lnRef>
-            <a:fillRef idx="0">
-              <a:schemeClr val="accent1"/>
-            </a:fillRef>
-            <a:effectRef idx="0">
-              <a:schemeClr val="accent1"/>
-            </a:effectRef>
-            <a:fontRef idx="minor">
-              <a:schemeClr val="tx1"/>
-            </a:fontRef>
-          </p:style>
-        </p:cxnSp>
-        <p:cxnSp>
-          <p:nvCxnSpPr>
-            <p:cNvPr id="49" name="Straight Arrow Connector 48"/>
-            <p:cNvCxnSpPr/>
-            <p:nvPr/>
-          </p:nvCxnSpPr>
-          <p:spPr>
-            <a:xfrm>
-              <a:off x="1348843" y="5670472"/>
-              <a:ext cx="3061841" cy="0"/>
-            </a:xfrm>
-            <a:prstGeom prst="straightConnector1">
-              <a:avLst/>
-            </a:prstGeom>
-            <a:ln w="19050">
-              <a:solidFill>
-                <a:schemeClr val="accent5">
-                  <a:lumMod val="75000"/>
-                </a:schemeClr>
-              </a:solidFill>
-              <a:headEnd type="arrow" w="med" len="med"/>
-              <a:tailEnd type="none" w="med" len="med"/>
-            </a:ln>
-          </p:spPr>
-          <p:style>
-            <a:lnRef idx="1">
-              <a:schemeClr val="accent1"/>
-            </a:lnRef>
-            <a:fillRef idx="0">
-              <a:schemeClr val="accent1"/>
-            </a:fillRef>
-            <a:effectRef idx="0">
-              <a:schemeClr val="accent1"/>
-            </a:effectRef>
-            <a:fontRef idx="minor">
-              <a:schemeClr val="tx1"/>
-            </a:fontRef>
-          </p:style>
-        </p:cxnSp>
-        <p:sp>
-          <p:nvSpPr>
-            <p:cNvPr id="50" name="TextBox 49"/>
-            <p:cNvSpPr txBox="1"/>
-            <p:nvPr/>
-          </p:nvSpPr>
-          <p:spPr>
-            <a:xfrm>
-              <a:off x="1416276" y="5395369"/>
-              <a:ext cx="2659870" cy="215444"/>
-            </a:xfrm>
-            <a:prstGeom prst="rect">
-              <a:avLst/>
-            </a:prstGeom>
-            <a:noFill/>
-          </p:spPr>
-          <p:txBody>
-            <a:bodyPr wrap="square" lIns="0" tIns="0" rIns="0" bIns="0" rtlCol="0">
-              <a:spAutoFit/>
-            </a:bodyPr>
-            <a:lstStyle/>
-            <a:p>
-              <a:r>
-                <a:rPr lang="en-US" sz="1400" dirty="0" err="1">
-                  <a:solidFill>
-                    <a:srgbClr val="00B050"/>
-                  </a:solidFill>
-                </a:rPr>
-                <a:t>handleAddresssBookChangedEvent</a:t>
-              </a:r>
-              <a:r>
-                <a:rPr lang="en-US" sz="1400" dirty="0">
-                  <a:solidFill>
-                    <a:srgbClr val="00B050"/>
-                  </a:solidFill>
-                </a:rPr>
-                <a:t>()</a:t>
-              </a:r>
-            </a:p>
-          </p:txBody>
-        </p:sp>
-        <p:grpSp>
-          <p:nvGrpSpPr>
-            <p:cNvPr id="13" name="Group 12"/>
-            <p:cNvGrpSpPr/>
-            <p:nvPr/>
-          </p:nvGrpSpPr>
-          <p:grpSpPr>
-            <a:xfrm>
-              <a:off x="1028134" y="5612032"/>
-              <a:ext cx="217349" cy="270072"/>
-              <a:chOff x="1028134" y="5612032"/>
-              <a:chExt cx="217349" cy="270072"/>
-            </a:xfrm>
-          </p:grpSpPr>
-          <p:sp>
-            <p:nvSpPr>
-              <p:cNvPr id="12" name="Freeform 11"/>
-              <p:cNvSpPr/>
-              <p:nvPr/>
-            </p:nvSpPr>
-            <p:spPr>
-              <a:xfrm rot="2600998" flipH="1" flipV="1">
-                <a:off x="1028134" y="5612032"/>
-                <a:ext cx="167452" cy="116880"/>
-              </a:xfrm>
-              <a:custGeom>
-                <a:avLst/>
-                <a:gdLst>
-                  <a:gd name="connsiteX0" fmla="*/ 0 w 226400"/>
-                  <a:gd name="connsiteY0" fmla="*/ 32920 h 171466"/>
-                  <a:gd name="connsiteX1" fmla="*/ 157018 w 226400"/>
-                  <a:gd name="connsiteY1" fmla="*/ 5211 h 171466"/>
-                  <a:gd name="connsiteX2" fmla="*/ 221673 w 226400"/>
-                  <a:gd name="connsiteY2" fmla="*/ 125284 h 171466"/>
-                  <a:gd name="connsiteX3" fmla="*/ 36945 w 226400"/>
-                  <a:gd name="connsiteY3" fmla="*/ 171466 h 171466"/>
-                </a:gdLst>
-                <a:ahLst/>
-                <a:cxnLst>
-                  <a:cxn ang="0">
-                    <a:pos x="connsiteX0" y="connsiteY0"/>
-                  </a:cxn>
-                  <a:cxn ang="0">
-                    <a:pos x="connsiteX1" y="connsiteY1"/>
-                  </a:cxn>
-                  <a:cxn ang="0">
-                    <a:pos x="connsiteX2" y="connsiteY2"/>
-                  </a:cxn>
-                  <a:cxn ang="0">
-                    <a:pos x="connsiteX3" y="connsiteY3"/>
-                  </a:cxn>
-                </a:cxnLst>
-                <a:rect l="l" t="t" r="r" b="b"/>
-                <a:pathLst>
-                  <a:path w="226400" h="171466">
-                    <a:moveTo>
-                      <a:pt x="0" y="32920"/>
-                    </a:moveTo>
-                    <a:cubicBezTo>
-                      <a:pt x="60036" y="11368"/>
-                      <a:pt x="120073" y="-10183"/>
-                      <a:pt x="157018" y="5211"/>
-                    </a:cubicBezTo>
-                    <a:cubicBezTo>
-                      <a:pt x="193963" y="20605"/>
-                      <a:pt x="241685" y="97575"/>
-                      <a:pt x="221673" y="125284"/>
-                    </a:cubicBezTo>
-                    <a:cubicBezTo>
-                      <a:pt x="201661" y="152993"/>
-                      <a:pt x="119303" y="162229"/>
-                      <a:pt x="36945" y="171466"/>
-                    </a:cubicBezTo>
-                  </a:path>
-                </a:pathLst>
-              </a:custGeom>
-              <a:ln w="19050">
-                <a:solidFill>
-                  <a:srgbClr val="00B050"/>
-                </a:solidFill>
-                <a:headEnd type="arrow" w="med" len="med"/>
-                <a:tailEnd type="none" w="med" len="med"/>
-              </a:ln>
-            </p:spPr>
-            <p:style>
-              <a:lnRef idx="1">
-                <a:schemeClr val="accent1"/>
-              </a:lnRef>
-              <a:fillRef idx="0">
-                <a:schemeClr val="accent1"/>
-              </a:fillRef>
-              <a:effectRef idx="0">
-                <a:schemeClr val="accent1"/>
-              </a:effectRef>
-              <a:fontRef idx="minor">
-                <a:schemeClr val="tx1"/>
-              </a:fontRef>
-            </p:style>
-            <p:txBody>
-              <a:bodyPr rtlCol="0" anchor="ctr"/>
-              <a:lstStyle/>
-              <a:p>
-                <a:pPr algn="ctr"/>
-                <a:endParaRPr lang="en-SG"/>
-              </a:p>
-            </p:txBody>
-          </p:sp>
-          <p:sp>
-            <p:nvSpPr>
-              <p:cNvPr id="56" name="Rectangle 55"/>
-              <p:cNvSpPr/>
-              <p:nvPr/>
-            </p:nvSpPr>
-            <p:spPr>
-              <a:xfrm>
-                <a:off x="1147403" y="5712513"/>
-                <a:ext cx="98080" cy="169591"/>
-              </a:xfrm>
-              <a:prstGeom prst="rect">
-                <a:avLst/>
-              </a:prstGeom>
-              <a:solidFill>
-                <a:srgbClr val="00B050"/>
-              </a:solidFill>
-              <a:ln>
-                <a:solidFill>
-                  <a:schemeClr val="bg1"/>
-                </a:solidFill>
-              </a:ln>
-              <a:effectLst/>
-            </p:spPr>
-            <p:style>
-              <a:lnRef idx="1">
-                <a:schemeClr val="accent3"/>
-              </a:lnRef>
-              <a:fillRef idx="2">
-                <a:schemeClr val="accent3"/>
-              </a:fillRef>
-              <a:effectRef idx="1">
-                <a:schemeClr val="accent3"/>
-              </a:effectRef>
-              <a:fontRef idx="minor">
-                <a:schemeClr val="dk1"/>
-              </a:fontRef>
-            </p:style>
-            <p:txBody>
-              <a:bodyPr rtlCol="0" anchor="ctr"/>
-              <a:lstStyle/>
-              <a:p>
-                <a:pPr algn="ctr"/>
-                <a:endParaRPr lang="en-SG" sz="1400"/>
-              </a:p>
-            </p:txBody>
-          </p:sp>
-        </p:grpSp>
-        <p:sp>
-          <p:nvSpPr>
-            <p:cNvPr id="57" name="TextBox 56"/>
-            <p:cNvSpPr txBox="1"/>
-            <p:nvPr/>
-          </p:nvSpPr>
-          <p:spPr>
-            <a:xfrm>
-              <a:off x="194562" y="5444571"/>
-              <a:ext cx="794081" cy="430887"/>
-            </a:xfrm>
-            <a:prstGeom prst="rect">
-              <a:avLst/>
-            </a:prstGeom>
-            <a:noFill/>
-          </p:spPr>
-          <p:txBody>
-            <a:bodyPr wrap="square" lIns="0" tIns="0" rIns="0" bIns="0" rtlCol="0">
-              <a:spAutoFit/>
-            </a:bodyPr>
-            <a:lstStyle/>
-            <a:p>
-              <a:pPr algn="r"/>
-              <a:r>
-                <a:rPr lang="en-US" sz="1400" dirty="0">
-                  <a:solidFill>
-                    <a:srgbClr val="00B050"/>
-                  </a:solidFill>
-                </a:rPr>
-                <a:t>Update status bar</a:t>
-              </a:r>
-            </a:p>
-          </p:txBody>
-        </p:sp>
         <p:grpSp>
           <p:nvGrpSpPr>
             <p:cNvPr id="58" name="Group 57"/>
@@ -5810,8 +4854,8 @@
           </p:nvGrpSpPr>
           <p:grpSpPr>
             <a:xfrm flipH="1">
-              <a:off x="7936842" y="5335662"/>
-              <a:ext cx="217349" cy="270072"/>
+              <a:off x="8966979" y="3879150"/>
+              <a:ext cx="217349" cy="430885"/>
               <a:chOff x="1028134" y="5612032"/>
               <a:chExt cx="217349" cy="270072"/>
             </a:xfrm>
@@ -5969,7 +5013,7 @@
           </p:nvSpPr>
           <p:spPr>
             <a:xfrm>
-              <a:off x="8223953" y="5180992"/>
+              <a:off x="9254091" y="3724481"/>
               <a:ext cx="539047" cy="430887"/>
             </a:xfrm>
             <a:prstGeom prst="rect">
@@ -6015,6 +5059,50 @@
             </a:p>
           </p:txBody>
         </p:sp>
+        <p:cxnSp>
+          <p:nvCxnSpPr>
+            <p:cNvPr id="78" name="Straight Arrow Connector 77">
+              <a:extLst>
+                <a:ext uri="{FF2B5EF4-FFF2-40B4-BE49-F238E27FC236}">
+                  <a16:creationId xmlns:a16="http://schemas.microsoft.com/office/drawing/2014/main" id="{4AB8DFA2-C3DE-4CDF-82C8-BDE3320A5C3E}"/>
+                </a:ext>
+              </a:extLst>
+            </p:cNvPr>
+            <p:cNvCxnSpPr>
+              <a:cxnSpLocks/>
+            </p:cNvCxnSpPr>
+            <p:nvPr/>
+          </p:nvCxnSpPr>
+          <p:spPr>
+            <a:xfrm flipV="1">
+              <a:off x="5727434" y="3883132"/>
+              <a:ext cx="3144005" cy="1"/>
+            </a:xfrm>
+            <a:prstGeom prst="straightConnector1">
+              <a:avLst/>
+            </a:prstGeom>
+            <a:ln w="19050">
+              <a:solidFill>
+                <a:srgbClr val="0070C0"/>
+              </a:solidFill>
+              <a:tailEnd type="arrow"/>
+            </a:ln>
+          </p:spPr>
+          <p:style>
+            <a:lnRef idx="1">
+              <a:schemeClr val="accent1"/>
+            </a:lnRef>
+            <a:fillRef idx="0">
+              <a:schemeClr val="accent1"/>
+            </a:fillRef>
+            <a:effectRef idx="0">
+              <a:schemeClr val="accent1"/>
+            </a:effectRef>
+            <a:fontRef idx="minor">
+              <a:schemeClr val="tx1"/>
+            </a:fontRef>
+          </p:style>
+        </p:cxnSp>
       </p:grpSp>
     </p:spTree>
     <p:extLst>

</xml_diff>